<commit_message>
Lab 0 question 1
Revised with additional data
</commit_message>
<xml_diff>
--- a/Lab0_question1.pptx
+++ b/Lab0_question1.pptx
@@ -5,7 +5,7 @@
     <p:sldMasterId id="2147483648" r:id="rId1"/>
   </p:sldMasterIdLst>
   <p:sldIdLst>
-    <p:sldId id="256" r:id="rId2"/>
+    <p:sldId id="257" r:id="rId2"/>
   </p:sldIdLst>
   <p:sldSz cx="12192000" cy="6858000"/>
   <p:notesSz cx="6858000" cy="9144000"/>
@@ -104,6 +104,11 @@
       </a:defRPr>
     </a:lvl9pPr>
   </p:defaultTextStyle>
+  <p:extLst>
+    <p:ext uri="{EFAFB233-063F-42B5-8137-9DF3F51BA10A}">
+      <p15:sldGuideLst xmlns:p15="http://schemas.microsoft.com/office/powerpoint/2012/main"/>
+    </p:ext>
+  </p:extLst>
 </p:presentation>
 </file>
 
@@ -254,7 +259,7 @@
           <a:p>
             <a:fld id="{7FC84C91-177F-B04A-BB01-B02195B95B4D}" type="datetimeFigureOut">
               <a:rPr lang="en-US" smtClean="0"/>
-              <a:t>7/14/21</a:t>
+              <a:t>7/14/2021</a:t>
             </a:fld>
             <a:endParaRPr lang="en-US"/>
           </a:p>
@@ -452,7 +457,7 @@
           <a:p>
             <a:fld id="{7FC84C91-177F-B04A-BB01-B02195B95B4D}" type="datetimeFigureOut">
               <a:rPr lang="en-US" smtClean="0"/>
-              <a:t>7/14/21</a:t>
+              <a:t>7/14/2021</a:t>
             </a:fld>
             <a:endParaRPr lang="en-US"/>
           </a:p>
@@ -660,7 +665,7 @@
           <a:p>
             <a:fld id="{7FC84C91-177F-B04A-BB01-B02195B95B4D}" type="datetimeFigureOut">
               <a:rPr lang="en-US" smtClean="0"/>
-              <a:t>7/14/21</a:t>
+              <a:t>7/14/2021</a:t>
             </a:fld>
             <a:endParaRPr lang="en-US"/>
           </a:p>
@@ -858,7 +863,7 @@
           <a:p>
             <a:fld id="{7FC84C91-177F-B04A-BB01-B02195B95B4D}" type="datetimeFigureOut">
               <a:rPr lang="en-US" smtClean="0"/>
-              <a:t>7/14/21</a:t>
+              <a:t>7/14/2021</a:t>
             </a:fld>
             <a:endParaRPr lang="en-US"/>
           </a:p>
@@ -1133,7 +1138,7 @@
           <a:p>
             <a:fld id="{7FC84C91-177F-B04A-BB01-B02195B95B4D}" type="datetimeFigureOut">
               <a:rPr lang="en-US" smtClean="0"/>
-              <a:t>7/14/21</a:t>
+              <a:t>7/14/2021</a:t>
             </a:fld>
             <a:endParaRPr lang="en-US"/>
           </a:p>
@@ -1398,7 +1403,7 @@
           <a:p>
             <a:fld id="{7FC84C91-177F-B04A-BB01-B02195B95B4D}" type="datetimeFigureOut">
               <a:rPr lang="en-US" smtClean="0"/>
-              <a:t>7/14/21</a:t>
+              <a:t>7/14/2021</a:t>
             </a:fld>
             <a:endParaRPr lang="en-US"/>
           </a:p>
@@ -1810,7 +1815,7 @@
           <a:p>
             <a:fld id="{7FC84C91-177F-B04A-BB01-B02195B95B4D}" type="datetimeFigureOut">
               <a:rPr lang="en-US" smtClean="0"/>
-              <a:t>7/14/21</a:t>
+              <a:t>7/14/2021</a:t>
             </a:fld>
             <a:endParaRPr lang="en-US"/>
           </a:p>
@@ -1951,7 +1956,7 @@
           <a:p>
             <a:fld id="{7FC84C91-177F-B04A-BB01-B02195B95B4D}" type="datetimeFigureOut">
               <a:rPr lang="en-US" smtClean="0"/>
-              <a:t>7/14/21</a:t>
+              <a:t>7/14/2021</a:t>
             </a:fld>
             <a:endParaRPr lang="en-US"/>
           </a:p>
@@ -2064,7 +2069,7 @@
           <a:p>
             <a:fld id="{7FC84C91-177F-B04A-BB01-B02195B95B4D}" type="datetimeFigureOut">
               <a:rPr lang="en-US" smtClean="0"/>
-              <a:t>7/14/21</a:t>
+              <a:t>7/14/2021</a:t>
             </a:fld>
             <a:endParaRPr lang="en-US"/>
           </a:p>
@@ -2375,7 +2380,7 @@
           <a:p>
             <a:fld id="{7FC84C91-177F-B04A-BB01-B02195B95B4D}" type="datetimeFigureOut">
               <a:rPr lang="en-US" smtClean="0"/>
-              <a:t>7/14/21</a:t>
+              <a:t>7/14/2021</a:t>
             </a:fld>
             <a:endParaRPr lang="en-US"/>
           </a:p>
@@ -2663,7 +2668,7 @@
           <a:p>
             <a:fld id="{7FC84C91-177F-B04A-BB01-B02195B95B4D}" type="datetimeFigureOut">
               <a:rPr lang="en-US" smtClean="0"/>
-              <a:t>7/14/21</a:t>
+              <a:t>7/14/2021</a:t>
             </a:fld>
             <a:endParaRPr lang="en-US"/>
           </a:p>
@@ -2904,7 +2909,7 @@
           <a:p>
             <a:fld id="{7FC84C91-177F-B04A-BB01-B02195B95B4D}" type="datetimeFigureOut">
               <a:rPr lang="en-US" smtClean="0"/>
-              <a:t>7/14/21</a:t>
+              <a:t>7/14/2021</a:t>
             </a:fld>
             <a:endParaRPr lang="en-US"/>
           </a:p>
@@ -3323,10 +3328,45 @@
       </p:grpSpPr>
       <p:sp>
         <p:nvSpPr>
-          <p:cNvPr id="4" name="Rectangle 3">
-            <a:extLst>
-              <a:ext uri="{FF2B5EF4-FFF2-40B4-BE49-F238E27FC236}">
-                <a16:creationId xmlns:a16="http://schemas.microsoft.com/office/drawing/2014/main" id="{748B4EB6-37A2-AB45-9D9A-3681F97782BB}"/>
+          <p:cNvPr id="2" name="Title 1">
+            <a:extLst>
+              <a:ext uri="{FF2B5EF4-FFF2-40B4-BE49-F238E27FC236}">
+                <a16:creationId xmlns:a16="http://schemas.microsoft.com/office/drawing/2014/main" id="{0D270DB1-B451-42C4-B776-F4DF9A34592B}"/>
+              </a:ext>
+            </a:extLst>
+          </p:cNvPr>
+          <p:cNvSpPr>
+            <a:spLocks noGrp="1"/>
+          </p:cNvSpPr>
+          <p:nvPr>
+            <p:ph type="title"/>
+          </p:nvPr>
+        </p:nvSpPr>
+        <p:spPr>
+          <a:xfrm>
+            <a:off x="301395" y="2004225"/>
+            <a:ext cx="1683057" cy="665640"/>
+          </a:xfrm>
+        </p:spPr>
+        <p:txBody>
+          <a:bodyPr>
+            <a:noAutofit/>
+          </a:bodyPr>
+          <a:lstStyle/>
+          <a:p>
+            <a:r>
+              <a:rPr lang="en-US" sz="900" b="1" dirty="0"/>
+              <a:t>The University of Maryland, Carnegie Mellon University, the Environmental Research Institute of Michigan, Martin Marietta, and SRI International collaborated on the DARPA-funded Autonomous Land Driven Vehicle (ALV) project in the United States.</a:t>
+            </a:r>
+          </a:p>
+        </p:txBody>
+      </p:sp>
+      <p:sp>
+        <p:nvSpPr>
+          <p:cNvPr id="5" name="Rectangle 4">
+            <a:extLst>
+              <a:ext uri="{FF2B5EF4-FFF2-40B4-BE49-F238E27FC236}">
+                <a16:creationId xmlns:a16="http://schemas.microsoft.com/office/drawing/2014/main" id="{A68ECF3D-D967-481E-BEC2-2E4B1CE02703}"/>
               </a:ext>
             </a:extLst>
           </p:cNvPr>
@@ -3334,9 +3374,9 @@
           <p:nvPr/>
         </p:nvSpPr>
         <p:spPr>
-          <a:xfrm>
-            <a:off x="1329070" y="3317358"/>
-            <a:ext cx="2360428" cy="223283"/>
+          <a:xfrm flipV="1">
+            <a:off x="5395813" y="3915990"/>
+            <a:ext cx="1203750" cy="45719"/>
           </a:xfrm>
           <a:prstGeom prst="rect">
             <a:avLst/>
@@ -3374,10 +3414,10 @@
       </p:sp>
       <p:sp>
         <p:nvSpPr>
-          <p:cNvPr id="5" name="Rectangle 4">
-            <a:extLst>
-              <a:ext uri="{FF2B5EF4-FFF2-40B4-BE49-F238E27FC236}">
-                <a16:creationId xmlns:a16="http://schemas.microsoft.com/office/drawing/2014/main" id="{B349A856-F6B1-C841-95DC-1D31ADE90630}"/>
+          <p:cNvPr id="7" name="Rectangle 6">
+            <a:extLst>
+              <a:ext uri="{FF2B5EF4-FFF2-40B4-BE49-F238E27FC236}">
+                <a16:creationId xmlns:a16="http://schemas.microsoft.com/office/drawing/2014/main" id="{80B66123-8CCF-4275-A48B-41B1F410CCDA}"/>
               </a:ext>
             </a:extLst>
           </p:cNvPr>
@@ -3385,9 +3425,162 @@
           <p:nvPr/>
         </p:nvSpPr>
         <p:spPr>
+          <a:xfrm flipV="1">
+            <a:off x="838200" y="3921284"/>
+            <a:ext cx="1203750" cy="45721"/>
+          </a:xfrm>
+          <a:prstGeom prst="rect">
+            <a:avLst/>
+          </a:prstGeom>
+          <a:solidFill>
+            <a:schemeClr val="accent6">
+              <a:lumMod val="50000"/>
+            </a:schemeClr>
+          </a:solidFill>
+        </p:spPr>
+        <p:style>
+          <a:lnRef idx="2">
+            <a:schemeClr val="accent1">
+              <a:shade val="50000"/>
+            </a:schemeClr>
+          </a:lnRef>
+          <a:fillRef idx="1">
+            <a:schemeClr val="accent1"/>
+          </a:fillRef>
+          <a:effectRef idx="0">
+            <a:schemeClr val="accent1"/>
+          </a:effectRef>
+          <a:fontRef idx="minor">
+            <a:schemeClr val="lt1"/>
+          </a:fontRef>
+        </p:style>
+        <p:txBody>
+          <a:bodyPr rtlCol="0" anchor="ctr"/>
+          <a:lstStyle/>
+          <a:p>
+            <a:pPr algn="ctr"/>
+            <a:endParaRPr lang="en-US"/>
+          </a:p>
+        </p:txBody>
+      </p:sp>
+      <p:sp>
+        <p:nvSpPr>
+          <p:cNvPr id="8" name="Rectangle 7">
+            <a:extLst>
+              <a:ext uri="{FF2B5EF4-FFF2-40B4-BE49-F238E27FC236}">
+                <a16:creationId xmlns:a16="http://schemas.microsoft.com/office/drawing/2014/main" id="{2B0F2AA3-4DB7-4892-82B9-989CD70D32B9}"/>
+              </a:ext>
+            </a:extLst>
+          </p:cNvPr>
+          <p:cNvSpPr/>
+          <p:nvPr/>
+        </p:nvSpPr>
+        <p:spPr>
           <a:xfrm>
-            <a:off x="3689498" y="3317358"/>
-            <a:ext cx="2360428" cy="223283"/>
+            <a:off x="7674615" y="3902224"/>
+            <a:ext cx="1203750" cy="45719"/>
+          </a:xfrm>
+          <a:prstGeom prst="rect">
+            <a:avLst/>
+          </a:prstGeom>
+          <a:solidFill>
+            <a:schemeClr val="accent6">
+              <a:lumMod val="50000"/>
+            </a:schemeClr>
+          </a:solidFill>
+        </p:spPr>
+        <p:style>
+          <a:lnRef idx="2">
+            <a:schemeClr val="accent1">
+              <a:shade val="50000"/>
+            </a:schemeClr>
+          </a:lnRef>
+          <a:fillRef idx="1">
+            <a:schemeClr val="accent1"/>
+          </a:fillRef>
+          <a:effectRef idx="0">
+            <a:schemeClr val="accent1"/>
+          </a:effectRef>
+          <a:fontRef idx="minor">
+            <a:schemeClr val="lt1"/>
+          </a:fontRef>
+        </p:style>
+        <p:txBody>
+          <a:bodyPr rtlCol="0" anchor="ctr"/>
+          <a:lstStyle/>
+          <a:p>
+            <a:pPr algn="ctr"/>
+            <a:endParaRPr lang="en-US"/>
+          </a:p>
+        </p:txBody>
+      </p:sp>
+      <p:sp>
+        <p:nvSpPr>
+          <p:cNvPr id="9" name="Rectangle 8">
+            <a:extLst>
+              <a:ext uri="{FF2B5EF4-FFF2-40B4-BE49-F238E27FC236}">
+                <a16:creationId xmlns:a16="http://schemas.microsoft.com/office/drawing/2014/main" id="{A4A5902A-A467-468F-B5C5-C17216D9F149}"/>
+              </a:ext>
+            </a:extLst>
+          </p:cNvPr>
+          <p:cNvSpPr/>
+          <p:nvPr/>
+        </p:nvSpPr>
+        <p:spPr>
+          <a:xfrm>
+            <a:off x="3117005" y="3919971"/>
+            <a:ext cx="1203753" cy="45720"/>
+          </a:xfrm>
+          <a:prstGeom prst="rect">
+            <a:avLst/>
+          </a:prstGeom>
+          <a:solidFill>
+            <a:schemeClr val="accent6">
+              <a:lumMod val="50000"/>
+            </a:schemeClr>
+          </a:solidFill>
+        </p:spPr>
+        <p:style>
+          <a:lnRef idx="2">
+            <a:schemeClr val="accent1">
+              <a:shade val="50000"/>
+            </a:schemeClr>
+          </a:lnRef>
+          <a:fillRef idx="1">
+            <a:schemeClr val="accent1"/>
+          </a:fillRef>
+          <a:effectRef idx="0">
+            <a:schemeClr val="accent1"/>
+          </a:effectRef>
+          <a:fontRef idx="minor">
+            <a:schemeClr val="lt1"/>
+          </a:fontRef>
+        </p:style>
+        <p:txBody>
+          <a:bodyPr rtlCol="0" anchor="ctr"/>
+          <a:lstStyle/>
+          <a:p>
+            <a:pPr algn="ctr"/>
+            <a:endParaRPr lang="en-US"/>
+          </a:p>
+        </p:txBody>
+      </p:sp>
+      <p:sp>
+        <p:nvSpPr>
+          <p:cNvPr id="11" name="Rectangle 10">
+            <a:extLst>
+              <a:ext uri="{FF2B5EF4-FFF2-40B4-BE49-F238E27FC236}">
+                <a16:creationId xmlns:a16="http://schemas.microsoft.com/office/drawing/2014/main" id="{6A8FDBFF-01AF-46DA-A35C-F73514E14BB5}"/>
+              </a:ext>
+            </a:extLst>
+          </p:cNvPr>
+          <p:cNvSpPr/>
+          <p:nvPr/>
+        </p:nvSpPr>
+        <p:spPr>
+          <a:xfrm>
+            <a:off x="8907747" y="3898424"/>
+            <a:ext cx="1016287" cy="45719"/>
           </a:xfrm>
           <a:prstGeom prst="rect">
             <a:avLst/>
@@ -3425,10 +3618,10 @@
       </p:sp>
       <p:sp>
         <p:nvSpPr>
-          <p:cNvPr id="6" name="Rectangle 5">
-            <a:extLst>
-              <a:ext uri="{FF2B5EF4-FFF2-40B4-BE49-F238E27FC236}">
-                <a16:creationId xmlns:a16="http://schemas.microsoft.com/office/drawing/2014/main" id="{AA2AC19F-6264-2A40-A084-D7751BF1451A}"/>
+          <p:cNvPr id="12" name="Rectangle 11">
+            <a:extLst>
+              <a:ext uri="{FF2B5EF4-FFF2-40B4-BE49-F238E27FC236}">
+                <a16:creationId xmlns:a16="http://schemas.microsoft.com/office/drawing/2014/main" id="{61A37CA4-7DF4-4E14-A24F-198BEB65DF86}"/>
               </a:ext>
             </a:extLst>
           </p:cNvPr>
@@ -3436,60 +3629,9 @@
           <p:nvPr/>
         </p:nvSpPr>
         <p:spPr>
-          <a:xfrm>
-            <a:off x="6049926" y="3317357"/>
-            <a:ext cx="2360428" cy="223283"/>
-          </a:xfrm>
-          <a:prstGeom prst="rect">
-            <a:avLst/>
-          </a:prstGeom>
-          <a:solidFill>
-            <a:schemeClr val="accent6">
-              <a:lumMod val="50000"/>
-            </a:schemeClr>
-          </a:solidFill>
-        </p:spPr>
-        <p:style>
-          <a:lnRef idx="2">
-            <a:schemeClr val="accent1">
-              <a:shade val="50000"/>
-            </a:schemeClr>
-          </a:lnRef>
-          <a:fillRef idx="1">
-            <a:schemeClr val="accent1"/>
-          </a:fillRef>
-          <a:effectRef idx="0">
-            <a:schemeClr val="accent1"/>
-          </a:effectRef>
-          <a:fontRef idx="minor">
-            <a:schemeClr val="lt1"/>
-          </a:fontRef>
-        </p:style>
-        <p:txBody>
-          <a:bodyPr rtlCol="0" anchor="ctr"/>
-          <a:lstStyle/>
-          <a:p>
-            <a:pPr algn="ctr"/>
-            <a:endParaRPr lang="en-US"/>
-          </a:p>
-        </p:txBody>
-      </p:sp>
-      <p:sp>
-        <p:nvSpPr>
-          <p:cNvPr id="7" name="Rectangle 6">
-            <a:extLst>
-              <a:ext uri="{FF2B5EF4-FFF2-40B4-BE49-F238E27FC236}">
-                <a16:creationId xmlns:a16="http://schemas.microsoft.com/office/drawing/2014/main" id="{47E8E9B3-1080-1F47-9EA2-6CFD6BEFFB27}"/>
-              </a:ext>
-            </a:extLst>
-          </p:cNvPr>
-          <p:cNvSpPr/>
-          <p:nvPr/>
-        </p:nvSpPr>
-        <p:spPr>
-          <a:xfrm>
-            <a:off x="8410354" y="3317356"/>
-            <a:ext cx="2360428" cy="223283"/>
+          <a:xfrm flipV="1">
+            <a:off x="6628945" y="3902224"/>
+            <a:ext cx="1016288" cy="45719"/>
           </a:xfrm>
           <a:prstGeom prst="rect">
             <a:avLst/>
@@ -3527,150 +3669,553 @@
       </p:sp>
       <p:sp>
         <p:nvSpPr>
-          <p:cNvPr id="8" name="TextBox 7">
-            <a:extLst>
-              <a:ext uri="{FF2B5EF4-FFF2-40B4-BE49-F238E27FC236}">
-                <a16:creationId xmlns:a16="http://schemas.microsoft.com/office/drawing/2014/main" id="{5B93036F-29D8-D244-A90F-74C0B5E430EF}"/>
-              </a:ext>
-            </a:extLst>
-          </p:cNvPr>
-          <p:cNvSpPr txBox="1"/>
+          <p:cNvPr id="13" name="Rectangle 12">
+            <a:extLst>
+              <a:ext uri="{FF2B5EF4-FFF2-40B4-BE49-F238E27FC236}">
+                <a16:creationId xmlns:a16="http://schemas.microsoft.com/office/drawing/2014/main" id="{7E48117D-CFF9-493B-A9B7-4B991D79F6EB}"/>
+              </a:ext>
+            </a:extLst>
+          </p:cNvPr>
+          <p:cNvSpPr/>
           <p:nvPr/>
         </p:nvSpPr>
         <p:spPr>
-          <a:xfrm>
-            <a:off x="940982" y="3685955"/>
-            <a:ext cx="776176" cy="369332"/>
+          <a:xfrm flipV="1">
+            <a:off x="4350143" y="3915990"/>
+            <a:ext cx="1016288" cy="45720"/>
           </a:xfrm>
           <a:prstGeom prst="rect">
             <a:avLst/>
           </a:prstGeom>
-          <a:noFill/>
-        </p:spPr>
-        <p:txBody>
-          <a:bodyPr wrap="square" rtlCol="0">
-            <a:spAutoFit/>
-          </a:bodyPr>
-          <a:lstStyle/>
-          <a:p>
-            <a:r>
-              <a:rPr lang="en-US" dirty="0"/>
-              <a:t>2005</a:t>
-            </a:r>
-          </a:p>
-        </p:txBody>
-      </p:sp>
-      <p:sp>
-        <p:nvSpPr>
-          <p:cNvPr id="9" name="TextBox 8">
-            <a:extLst>
-              <a:ext uri="{FF2B5EF4-FFF2-40B4-BE49-F238E27FC236}">
-                <a16:creationId xmlns:a16="http://schemas.microsoft.com/office/drawing/2014/main" id="{43751A70-59F0-8848-9AFB-885A32BA8530}"/>
-              </a:ext>
-            </a:extLst>
-          </p:cNvPr>
-          <p:cNvSpPr txBox="1"/>
+          <a:solidFill>
+            <a:schemeClr val="accent6">
+              <a:lumMod val="75000"/>
+            </a:schemeClr>
+          </a:solidFill>
+        </p:spPr>
+        <p:style>
+          <a:lnRef idx="2">
+            <a:schemeClr val="accent1">
+              <a:shade val="50000"/>
+            </a:schemeClr>
+          </a:lnRef>
+          <a:fillRef idx="1">
+            <a:schemeClr val="accent1"/>
+          </a:fillRef>
+          <a:effectRef idx="0">
+            <a:schemeClr val="accent1"/>
+          </a:effectRef>
+          <a:fontRef idx="minor">
+            <a:schemeClr val="lt1"/>
+          </a:fontRef>
+        </p:style>
+        <p:txBody>
+          <a:bodyPr rtlCol="0" anchor="ctr"/>
+          <a:lstStyle/>
+          <a:p>
+            <a:pPr algn="ctr"/>
+            <a:endParaRPr lang="en-US"/>
+          </a:p>
+        </p:txBody>
+      </p:sp>
+      <p:sp>
+        <p:nvSpPr>
+          <p:cNvPr id="14" name="Rectangle 13">
+            <a:extLst>
+              <a:ext uri="{FF2B5EF4-FFF2-40B4-BE49-F238E27FC236}">
+                <a16:creationId xmlns:a16="http://schemas.microsoft.com/office/drawing/2014/main" id="{2E10272D-291C-4A52-B24D-AE5BC4E3DD28}"/>
+              </a:ext>
+            </a:extLst>
+          </p:cNvPr>
+          <p:cNvSpPr/>
           <p:nvPr/>
         </p:nvSpPr>
         <p:spPr>
           <a:xfrm>
-            <a:off x="3301410" y="2763360"/>
-            <a:ext cx="776176" cy="369332"/>
+            <a:off x="2071335" y="3921285"/>
+            <a:ext cx="1016285" cy="45720"/>
           </a:xfrm>
           <a:prstGeom prst="rect">
             <a:avLst/>
           </a:prstGeom>
-          <a:noFill/>
-        </p:spPr>
-        <p:txBody>
-          <a:bodyPr wrap="square" rtlCol="0">
-            <a:spAutoFit/>
-          </a:bodyPr>
-          <a:lstStyle/>
-          <a:p>
-            <a:r>
-              <a:rPr lang="en-US" dirty="0"/>
-              <a:t>2009</a:t>
-            </a:r>
-          </a:p>
-        </p:txBody>
-      </p:sp>
-      <p:sp>
-        <p:nvSpPr>
-          <p:cNvPr id="10" name="TextBox 9">
-            <a:extLst>
-              <a:ext uri="{FF2B5EF4-FFF2-40B4-BE49-F238E27FC236}">
-                <a16:creationId xmlns:a16="http://schemas.microsoft.com/office/drawing/2014/main" id="{C367DE64-02F2-524D-A6A9-7B35D6BF77CA}"/>
-              </a:ext>
-            </a:extLst>
-          </p:cNvPr>
-          <p:cNvSpPr txBox="1"/>
+          <a:solidFill>
+            <a:schemeClr val="accent6">
+              <a:lumMod val="75000"/>
+            </a:schemeClr>
+          </a:solidFill>
+        </p:spPr>
+        <p:style>
+          <a:lnRef idx="2">
+            <a:schemeClr val="accent1">
+              <a:shade val="50000"/>
+            </a:schemeClr>
+          </a:lnRef>
+          <a:fillRef idx="1">
+            <a:schemeClr val="accent1"/>
+          </a:fillRef>
+          <a:effectRef idx="0">
+            <a:schemeClr val="accent1"/>
+          </a:effectRef>
+          <a:fontRef idx="minor">
+            <a:schemeClr val="lt1"/>
+          </a:fontRef>
+        </p:style>
+        <p:txBody>
+          <a:bodyPr rtlCol="0" anchor="ctr"/>
+          <a:lstStyle/>
+          <a:p>
+            <a:pPr algn="ctr"/>
+            <a:endParaRPr lang="en-US" dirty="0"/>
+          </a:p>
+        </p:txBody>
+      </p:sp>
+      <p:sp>
+        <p:nvSpPr>
+          <p:cNvPr id="15" name="Oval 14">
+            <a:extLst>
+              <a:ext uri="{FF2B5EF4-FFF2-40B4-BE49-F238E27FC236}">
+                <a16:creationId xmlns:a16="http://schemas.microsoft.com/office/drawing/2014/main" id="{0E0821CE-74AB-4813-A5D6-47CD045F2622}"/>
+              </a:ext>
+            </a:extLst>
+          </p:cNvPr>
+          <p:cNvSpPr/>
           <p:nvPr/>
         </p:nvSpPr>
         <p:spPr>
           <a:xfrm>
-            <a:off x="5661838" y="3720660"/>
-            <a:ext cx="776176" cy="369332"/>
-          </a:xfrm>
-          <a:prstGeom prst="rect">
+            <a:off x="5273396" y="2948277"/>
+            <a:ext cx="186069" cy="215047"/>
+          </a:xfrm>
+          <a:prstGeom prst="ellipse">
             <a:avLst/>
           </a:prstGeom>
-          <a:noFill/>
-        </p:spPr>
-        <p:txBody>
-          <a:bodyPr wrap="square" rtlCol="0">
-            <a:spAutoFit/>
-          </a:bodyPr>
-          <a:lstStyle/>
-          <a:p>
-            <a:r>
-              <a:rPr lang="en-US" dirty="0"/>
-              <a:t>2016</a:t>
-            </a:r>
-          </a:p>
-        </p:txBody>
-      </p:sp>
-      <p:sp>
-        <p:nvSpPr>
-          <p:cNvPr id="11" name="TextBox 10">
-            <a:extLst>
-              <a:ext uri="{FF2B5EF4-FFF2-40B4-BE49-F238E27FC236}">
-                <a16:creationId xmlns:a16="http://schemas.microsoft.com/office/drawing/2014/main" id="{6B5CFC8D-62D7-AE46-804C-0FDA87D04FAA}"/>
-              </a:ext>
-            </a:extLst>
-          </p:cNvPr>
-          <p:cNvSpPr txBox="1"/>
+          <a:solidFill>
+            <a:schemeClr val="tx1"/>
+          </a:solidFill>
+        </p:spPr>
+        <p:style>
+          <a:lnRef idx="2">
+            <a:schemeClr val="accent1">
+              <a:shade val="50000"/>
+            </a:schemeClr>
+          </a:lnRef>
+          <a:fillRef idx="1">
+            <a:schemeClr val="accent1"/>
+          </a:fillRef>
+          <a:effectRef idx="0">
+            <a:schemeClr val="accent1"/>
+          </a:effectRef>
+          <a:fontRef idx="minor">
+            <a:schemeClr val="lt1"/>
+          </a:fontRef>
+        </p:style>
+        <p:txBody>
+          <a:bodyPr rtlCol="0" anchor="ctr"/>
+          <a:lstStyle/>
+          <a:p>
+            <a:pPr algn="ctr"/>
+            <a:endParaRPr lang="en-US" dirty="0"/>
+          </a:p>
+        </p:txBody>
+      </p:sp>
+      <p:sp>
+        <p:nvSpPr>
+          <p:cNvPr id="16" name="Oval 15">
+            <a:extLst>
+              <a:ext uri="{FF2B5EF4-FFF2-40B4-BE49-F238E27FC236}">
+                <a16:creationId xmlns:a16="http://schemas.microsoft.com/office/drawing/2014/main" id="{E7FBAC98-7916-4E7F-991A-292EC1E7E2D9}"/>
+              </a:ext>
+            </a:extLst>
+          </p:cNvPr>
+          <p:cNvSpPr/>
           <p:nvPr/>
         </p:nvSpPr>
         <p:spPr>
           <a:xfrm>
-            <a:off x="8022266" y="2763730"/>
-            <a:ext cx="776176" cy="369332"/>
-          </a:xfrm>
-          <a:prstGeom prst="rect">
+            <a:off x="1948915" y="4522173"/>
+            <a:ext cx="186069" cy="215047"/>
+          </a:xfrm>
+          <a:prstGeom prst="ellipse">
             <a:avLst/>
           </a:prstGeom>
-          <a:noFill/>
-        </p:spPr>
-        <p:txBody>
-          <a:bodyPr wrap="square" rtlCol="0">
-            <a:spAutoFit/>
-          </a:bodyPr>
-          <a:lstStyle/>
-          <a:p>
-            <a:r>
-              <a:rPr lang="en-US" dirty="0"/>
-              <a:t>2021</a:t>
-            </a:r>
+          <a:solidFill>
+            <a:schemeClr val="tx1"/>
+          </a:solidFill>
+        </p:spPr>
+        <p:style>
+          <a:lnRef idx="2">
+            <a:schemeClr val="accent1">
+              <a:shade val="50000"/>
+            </a:schemeClr>
+          </a:lnRef>
+          <a:fillRef idx="1">
+            <a:schemeClr val="accent1"/>
+          </a:fillRef>
+          <a:effectRef idx="0">
+            <a:schemeClr val="accent1"/>
+          </a:effectRef>
+          <a:fontRef idx="minor">
+            <a:schemeClr val="lt1"/>
+          </a:fontRef>
+        </p:style>
+        <p:txBody>
+          <a:bodyPr rtlCol="0" anchor="ctr"/>
+          <a:lstStyle/>
+          <a:p>
+            <a:pPr algn="ctr"/>
+            <a:endParaRPr lang="en-US" dirty="0"/>
+          </a:p>
+        </p:txBody>
+      </p:sp>
+      <p:sp>
+        <p:nvSpPr>
+          <p:cNvPr id="17" name="Oval 16">
+            <a:extLst>
+              <a:ext uri="{FF2B5EF4-FFF2-40B4-BE49-F238E27FC236}">
+                <a16:creationId xmlns:a16="http://schemas.microsoft.com/office/drawing/2014/main" id="{813997A9-AC20-4FC3-8973-F11282C5B77E}"/>
+              </a:ext>
+            </a:extLst>
+          </p:cNvPr>
+          <p:cNvSpPr/>
+          <p:nvPr/>
+        </p:nvSpPr>
+        <p:spPr>
+          <a:xfrm>
+            <a:off x="2994585" y="2934145"/>
+            <a:ext cx="186069" cy="215047"/>
+          </a:xfrm>
+          <a:prstGeom prst="ellipse">
+            <a:avLst/>
+          </a:prstGeom>
+          <a:solidFill>
+            <a:schemeClr val="tx1"/>
+          </a:solidFill>
+        </p:spPr>
+        <p:style>
+          <a:lnRef idx="2">
+            <a:schemeClr val="accent1">
+              <a:shade val="50000"/>
+            </a:schemeClr>
+          </a:lnRef>
+          <a:fillRef idx="1">
+            <a:schemeClr val="accent1"/>
+          </a:fillRef>
+          <a:effectRef idx="0">
+            <a:schemeClr val="accent1"/>
+          </a:effectRef>
+          <a:fontRef idx="minor">
+            <a:schemeClr val="lt1"/>
+          </a:fontRef>
+        </p:style>
+        <p:txBody>
+          <a:bodyPr rtlCol="0" anchor="ctr"/>
+          <a:lstStyle/>
+          <a:p>
+            <a:pPr algn="ctr"/>
+            <a:endParaRPr lang="en-US" dirty="0"/>
+          </a:p>
+        </p:txBody>
+      </p:sp>
+      <p:sp>
+        <p:nvSpPr>
+          <p:cNvPr id="18" name="Oval 17">
+            <a:extLst>
+              <a:ext uri="{FF2B5EF4-FFF2-40B4-BE49-F238E27FC236}">
+                <a16:creationId xmlns:a16="http://schemas.microsoft.com/office/drawing/2014/main" id="{E1F570B6-E719-4C8F-B6CA-DFB2C4C9D58A}"/>
+              </a:ext>
+            </a:extLst>
+          </p:cNvPr>
+          <p:cNvSpPr/>
+          <p:nvPr/>
+        </p:nvSpPr>
+        <p:spPr>
+          <a:xfrm>
+            <a:off x="6565287" y="4498670"/>
+            <a:ext cx="186069" cy="215047"/>
+          </a:xfrm>
+          <a:prstGeom prst="ellipse">
+            <a:avLst/>
+          </a:prstGeom>
+          <a:solidFill>
+            <a:schemeClr val="tx1"/>
+          </a:solidFill>
+        </p:spPr>
+        <p:style>
+          <a:lnRef idx="2">
+            <a:schemeClr val="accent1">
+              <a:shade val="50000"/>
+            </a:schemeClr>
+          </a:lnRef>
+          <a:fillRef idx="1">
+            <a:schemeClr val="accent1"/>
+          </a:fillRef>
+          <a:effectRef idx="0">
+            <a:schemeClr val="accent1"/>
+          </a:effectRef>
+          <a:fontRef idx="minor">
+            <a:schemeClr val="lt1"/>
+          </a:fontRef>
+        </p:style>
+        <p:txBody>
+          <a:bodyPr rtlCol="0" anchor="ctr"/>
+          <a:lstStyle/>
+          <a:p>
+            <a:pPr algn="ctr"/>
+            <a:endParaRPr lang="en-US" dirty="0"/>
+          </a:p>
+        </p:txBody>
+      </p:sp>
+      <p:sp>
+        <p:nvSpPr>
+          <p:cNvPr id="19" name="Oval 18">
+            <a:extLst>
+              <a:ext uri="{FF2B5EF4-FFF2-40B4-BE49-F238E27FC236}">
+                <a16:creationId xmlns:a16="http://schemas.microsoft.com/office/drawing/2014/main" id="{78B8066A-5B81-44A7-BFA1-92C0A5CF4F63}"/>
+              </a:ext>
+            </a:extLst>
+          </p:cNvPr>
+          <p:cNvSpPr/>
+          <p:nvPr/>
+        </p:nvSpPr>
+        <p:spPr>
+          <a:xfrm>
+            <a:off x="791530" y="2948277"/>
+            <a:ext cx="186069" cy="215047"/>
+          </a:xfrm>
+          <a:prstGeom prst="ellipse">
+            <a:avLst/>
+          </a:prstGeom>
+          <a:solidFill>
+            <a:schemeClr val="tx1"/>
+          </a:solidFill>
+        </p:spPr>
+        <p:style>
+          <a:lnRef idx="2">
+            <a:schemeClr val="accent1">
+              <a:shade val="50000"/>
+            </a:schemeClr>
+          </a:lnRef>
+          <a:fillRef idx="1">
+            <a:schemeClr val="accent1"/>
+          </a:fillRef>
+          <a:effectRef idx="0">
+            <a:schemeClr val="accent1"/>
+          </a:effectRef>
+          <a:fontRef idx="minor">
+            <a:schemeClr val="lt1"/>
+          </a:fontRef>
+        </p:style>
+        <p:txBody>
+          <a:bodyPr rtlCol="0" anchor="ctr"/>
+          <a:lstStyle/>
+          <a:p>
+            <a:pPr algn="ctr"/>
+            <a:endParaRPr lang="en-US" dirty="0"/>
+          </a:p>
+        </p:txBody>
+      </p:sp>
+      <p:sp>
+        <p:nvSpPr>
+          <p:cNvPr id="20" name="Oval 19">
+            <a:extLst>
+              <a:ext uri="{FF2B5EF4-FFF2-40B4-BE49-F238E27FC236}">
+                <a16:creationId xmlns:a16="http://schemas.microsoft.com/office/drawing/2014/main" id="{985EED07-ACF5-4D1C-A253-E529F4A7EBF8}"/>
+              </a:ext>
+            </a:extLst>
+          </p:cNvPr>
+          <p:cNvSpPr/>
+          <p:nvPr/>
+        </p:nvSpPr>
+        <p:spPr>
+          <a:xfrm>
+            <a:off x="7552207" y="2938443"/>
+            <a:ext cx="186069" cy="215047"/>
+          </a:xfrm>
+          <a:prstGeom prst="ellipse">
+            <a:avLst/>
+          </a:prstGeom>
+          <a:solidFill>
+            <a:schemeClr val="tx1"/>
+          </a:solidFill>
+        </p:spPr>
+        <p:style>
+          <a:lnRef idx="2">
+            <a:schemeClr val="accent1">
+              <a:shade val="50000"/>
+            </a:schemeClr>
+          </a:lnRef>
+          <a:fillRef idx="1">
+            <a:schemeClr val="accent1"/>
+          </a:fillRef>
+          <a:effectRef idx="0">
+            <a:schemeClr val="accent1"/>
+          </a:effectRef>
+          <a:fontRef idx="minor">
+            <a:schemeClr val="lt1"/>
+          </a:fontRef>
+        </p:style>
+        <p:txBody>
+          <a:bodyPr rtlCol="0" anchor="ctr"/>
+          <a:lstStyle/>
+          <a:p>
+            <a:pPr algn="ctr"/>
+            <a:endParaRPr lang="en-US" dirty="0"/>
+          </a:p>
+        </p:txBody>
+      </p:sp>
+      <p:sp>
+        <p:nvSpPr>
+          <p:cNvPr id="21" name="Oval 20">
+            <a:extLst>
+              <a:ext uri="{FF2B5EF4-FFF2-40B4-BE49-F238E27FC236}">
+                <a16:creationId xmlns:a16="http://schemas.microsoft.com/office/drawing/2014/main" id="{162C4F5D-C5E5-49C5-B49A-1B73DC8E73D8}"/>
+              </a:ext>
+            </a:extLst>
+          </p:cNvPr>
+          <p:cNvSpPr/>
+          <p:nvPr/>
+        </p:nvSpPr>
+        <p:spPr>
+          <a:xfrm>
+            <a:off x="4257101" y="4500263"/>
+            <a:ext cx="186069" cy="215047"/>
+          </a:xfrm>
+          <a:prstGeom prst="ellipse">
+            <a:avLst/>
+          </a:prstGeom>
+          <a:solidFill>
+            <a:schemeClr val="tx1"/>
+          </a:solidFill>
+        </p:spPr>
+        <p:style>
+          <a:lnRef idx="2">
+            <a:schemeClr val="accent1">
+              <a:shade val="50000"/>
+            </a:schemeClr>
+          </a:lnRef>
+          <a:fillRef idx="1">
+            <a:schemeClr val="accent1"/>
+          </a:fillRef>
+          <a:effectRef idx="0">
+            <a:schemeClr val="accent1"/>
+          </a:effectRef>
+          <a:fontRef idx="minor">
+            <a:schemeClr val="lt1"/>
+          </a:fontRef>
+        </p:style>
+        <p:txBody>
+          <a:bodyPr rtlCol="0" anchor="ctr"/>
+          <a:lstStyle/>
+          <a:p>
+            <a:pPr algn="ctr"/>
+            <a:endParaRPr lang="en-US" dirty="0"/>
+          </a:p>
+        </p:txBody>
+      </p:sp>
+      <p:sp>
+        <p:nvSpPr>
+          <p:cNvPr id="23" name="Oval 22">
+            <a:extLst>
+              <a:ext uri="{FF2B5EF4-FFF2-40B4-BE49-F238E27FC236}">
+                <a16:creationId xmlns:a16="http://schemas.microsoft.com/office/drawing/2014/main" id="{AFCC9373-BC91-4A04-9935-8CE0CE99A894}"/>
+              </a:ext>
+            </a:extLst>
+          </p:cNvPr>
+          <p:cNvSpPr/>
+          <p:nvPr/>
+        </p:nvSpPr>
+        <p:spPr>
+          <a:xfrm>
+            <a:off x="8812730" y="4522171"/>
+            <a:ext cx="186069" cy="215047"/>
+          </a:xfrm>
+          <a:prstGeom prst="ellipse">
+            <a:avLst/>
+          </a:prstGeom>
+          <a:solidFill>
+            <a:schemeClr val="tx1"/>
+          </a:solidFill>
+        </p:spPr>
+        <p:style>
+          <a:lnRef idx="2">
+            <a:schemeClr val="accent1">
+              <a:shade val="50000"/>
+            </a:schemeClr>
+          </a:lnRef>
+          <a:fillRef idx="1">
+            <a:schemeClr val="accent1"/>
+          </a:fillRef>
+          <a:effectRef idx="0">
+            <a:schemeClr val="accent1"/>
+          </a:effectRef>
+          <a:fontRef idx="minor">
+            <a:schemeClr val="lt1"/>
+          </a:fontRef>
+        </p:style>
+        <p:txBody>
+          <a:bodyPr rtlCol="0" anchor="ctr"/>
+          <a:lstStyle/>
+          <a:p>
+            <a:pPr algn="ctr"/>
+            <a:endParaRPr lang="en-US" dirty="0"/>
+          </a:p>
+        </p:txBody>
+      </p:sp>
+      <p:sp>
+        <p:nvSpPr>
+          <p:cNvPr id="24" name="Oval 23">
+            <a:extLst>
+              <a:ext uri="{FF2B5EF4-FFF2-40B4-BE49-F238E27FC236}">
+                <a16:creationId xmlns:a16="http://schemas.microsoft.com/office/drawing/2014/main" id="{D47BC9F7-7C99-46F0-AE08-5F49F6F3012A}"/>
+              </a:ext>
+            </a:extLst>
+          </p:cNvPr>
+          <p:cNvSpPr/>
+          <p:nvPr/>
+        </p:nvSpPr>
+        <p:spPr>
+          <a:xfrm>
+            <a:off x="9860381" y="2934144"/>
+            <a:ext cx="186069" cy="215047"/>
+          </a:xfrm>
+          <a:prstGeom prst="ellipse">
+            <a:avLst/>
+          </a:prstGeom>
+          <a:solidFill>
+            <a:schemeClr val="tx1"/>
+          </a:solidFill>
+        </p:spPr>
+        <p:style>
+          <a:lnRef idx="2">
+            <a:schemeClr val="accent1">
+              <a:shade val="50000"/>
+            </a:schemeClr>
+          </a:lnRef>
+          <a:fillRef idx="1">
+            <a:schemeClr val="accent1"/>
+          </a:fillRef>
+          <a:effectRef idx="0">
+            <a:schemeClr val="accent1"/>
+          </a:effectRef>
+          <a:fontRef idx="minor">
+            <a:schemeClr val="lt1"/>
+          </a:fontRef>
+        </p:style>
+        <p:txBody>
+          <a:bodyPr rtlCol="0" anchor="ctr"/>
+          <a:lstStyle/>
+          <a:p>
+            <a:pPr algn="ctr"/>
+            <a:endParaRPr lang="en-US" dirty="0"/>
           </a:p>
         </p:txBody>
       </p:sp>
       <p:cxnSp>
         <p:nvCxnSpPr>
-          <p:cNvPr id="13" name="Straight Connector 12">
-            <a:extLst>
-              <a:ext uri="{FF2B5EF4-FFF2-40B4-BE49-F238E27FC236}">
-                <a16:creationId xmlns:a16="http://schemas.microsoft.com/office/drawing/2014/main" id="{1C4D31B0-43F9-9148-A241-696EA8834108}"/>
+          <p:cNvPr id="26" name="Straight Connector 25">
+            <a:extLst>
+              <a:ext uri="{FF2B5EF4-FFF2-40B4-BE49-F238E27FC236}">
+                <a16:creationId xmlns:a16="http://schemas.microsoft.com/office/drawing/2014/main" id="{36AEA52F-2EBE-41C6-B35A-4375A29948DA}"/>
               </a:ext>
             </a:extLst>
           </p:cNvPr>
@@ -3681,7 +4226,7 @@
         </p:nvCxnSpPr>
         <p:spPr>
           <a:xfrm flipV="1">
-            <a:off x="1329070" y="2651716"/>
+            <a:off x="902942" y="3108916"/>
             <a:ext cx="0" cy="665640"/>
           </a:xfrm>
           <a:prstGeom prst="line">
@@ -3711,10 +4256,10 @@
       </p:cxnSp>
       <p:cxnSp>
         <p:nvCxnSpPr>
-          <p:cNvPr id="18" name="Straight Connector 17">
-            <a:extLst>
-              <a:ext uri="{FF2B5EF4-FFF2-40B4-BE49-F238E27FC236}">
-                <a16:creationId xmlns:a16="http://schemas.microsoft.com/office/drawing/2014/main" id="{FBD32F0D-CE5C-DF4E-A47D-FD479A58DFAA}"/>
+          <p:cNvPr id="27" name="Straight Connector 26">
+            <a:extLst>
+              <a:ext uri="{FF2B5EF4-FFF2-40B4-BE49-F238E27FC236}">
+                <a16:creationId xmlns:a16="http://schemas.microsoft.com/office/drawing/2014/main" id="{8C5B2863-3467-4928-9913-95FFDB22BABC}"/>
               </a:ext>
             </a:extLst>
           </p:cNvPr>
@@ -3725,7 +4270,7 @@
         </p:nvCxnSpPr>
         <p:spPr>
           <a:xfrm flipV="1">
-            <a:off x="3685068" y="3537801"/>
+            <a:off x="2041950" y="4049670"/>
             <a:ext cx="0" cy="665640"/>
           </a:xfrm>
           <a:prstGeom prst="line">
@@ -3755,10 +4300,10 @@
       </p:cxnSp>
       <p:cxnSp>
         <p:nvCxnSpPr>
-          <p:cNvPr id="19" name="Straight Connector 18">
-            <a:extLst>
-              <a:ext uri="{FF2B5EF4-FFF2-40B4-BE49-F238E27FC236}">
-                <a16:creationId xmlns:a16="http://schemas.microsoft.com/office/drawing/2014/main" id="{EE9A5A82-632C-EF4B-84C5-9D72CF8C3AF3}"/>
+          <p:cNvPr id="28" name="Straight Connector 27">
+            <a:extLst>
+              <a:ext uri="{FF2B5EF4-FFF2-40B4-BE49-F238E27FC236}">
+                <a16:creationId xmlns:a16="http://schemas.microsoft.com/office/drawing/2014/main" id="{C0A078E8-7482-4BB9-AB64-3D99A1CAC52B}"/>
               </a:ext>
             </a:extLst>
           </p:cNvPr>
@@ -3769,7 +4314,7 @@
         </p:nvCxnSpPr>
         <p:spPr>
           <a:xfrm flipV="1">
-            <a:off x="6049926" y="2659949"/>
+            <a:off x="3087620" y="3096180"/>
             <a:ext cx="0" cy="665640"/>
           </a:xfrm>
           <a:prstGeom prst="line">
@@ -3799,10 +4344,10 @@
       </p:cxnSp>
       <p:cxnSp>
         <p:nvCxnSpPr>
-          <p:cNvPr id="20" name="Straight Connector 19">
-            <a:extLst>
-              <a:ext uri="{FF2B5EF4-FFF2-40B4-BE49-F238E27FC236}">
-                <a16:creationId xmlns:a16="http://schemas.microsoft.com/office/drawing/2014/main" id="{A96C0C4C-8F17-6942-AC2B-E46480D6A1A4}"/>
+          <p:cNvPr id="29" name="Straight Connector 28">
+            <a:extLst>
+              <a:ext uri="{FF2B5EF4-FFF2-40B4-BE49-F238E27FC236}">
+                <a16:creationId xmlns:a16="http://schemas.microsoft.com/office/drawing/2014/main" id="{C01ACA94-F812-4C2B-AB00-DD982DD3E04C}"/>
               </a:ext>
             </a:extLst>
           </p:cNvPr>
@@ -3813,7 +4358,7 @@
         </p:nvCxnSpPr>
         <p:spPr>
           <a:xfrm flipV="1">
-            <a:off x="8410354" y="3496857"/>
+            <a:off x="5366431" y="3108916"/>
             <a:ext cx="0" cy="665640"/>
           </a:xfrm>
           <a:prstGeom prst="line">
@@ -3841,208 +4386,232 @@
           </a:fontRef>
         </p:style>
       </p:cxnSp>
-      <p:sp>
-        <p:nvSpPr>
-          <p:cNvPr id="21" name="Oval 20">
-            <a:extLst>
-              <a:ext uri="{FF2B5EF4-FFF2-40B4-BE49-F238E27FC236}">
-                <a16:creationId xmlns:a16="http://schemas.microsoft.com/office/drawing/2014/main" id="{9BF7A451-3944-AD4C-98FB-B036C257AE3C}"/>
-              </a:ext>
-            </a:extLst>
-          </p:cNvPr>
-          <p:cNvSpPr/>
+      <p:cxnSp>
+        <p:nvCxnSpPr>
+          <p:cNvPr id="30" name="Straight Connector 29">
+            <a:extLst>
+              <a:ext uri="{FF2B5EF4-FFF2-40B4-BE49-F238E27FC236}">
+                <a16:creationId xmlns:a16="http://schemas.microsoft.com/office/drawing/2014/main" id="{EC15BC23-AE3B-4631-8DD9-3B64C638552C}"/>
+              </a:ext>
+            </a:extLst>
+          </p:cNvPr>
+          <p:cNvCxnSpPr>
+            <a:cxnSpLocks/>
+          </p:cNvCxnSpPr>
           <p:nvPr/>
-        </p:nvSpPr>
-        <p:spPr>
-          <a:xfrm>
-            <a:off x="1233376" y="2428431"/>
-            <a:ext cx="186069" cy="215047"/>
-          </a:xfrm>
-          <a:prstGeom prst="ellipse">
+        </p:nvCxnSpPr>
+        <p:spPr>
+          <a:xfrm flipV="1">
+            <a:off x="7645233" y="3080896"/>
+            <a:ext cx="0" cy="665640"/>
+          </a:xfrm>
+          <a:prstGeom prst="line">
             <a:avLst/>
           </a:prstGeom>
-          <a:solidFill>
-            <a:schemeClr val="tx1"/>
-          </a:solidFill>
+          <a:ln>
+            <a:solidFill>
+              <a:schemeClr val="tx1"/>
+            </a:solidFill>
+            <a:prstDash val="sysDash"/>
+          </a:ln>
         </p:spPr>
         <p:style>
-          <a:lnRef idx="2">
-            <a:schemeClr val="accent1">
-              <a:shade val="50000"/>
-            </a:schemeClr>
+          <a:lnRef idx="1">
+            <a:schemeClr val="accent1"/>
           </a:lnRef>
-          <a:fillRef idx="1">
+          <a:fillRef idx="0">
             <a:schemeClr val="accent1"/>
           </a:fillRef>
           <a:effectRef idx="0">
             <a:schemeClr val="accent1"/>
           </a:effectRef>
           <a:fontRef idx="minor">
-            <a:schemeClr val="lt1"/>
+            <a:schemeClr val="tx1"/>
           </a:fontRef>
         </p:style>
-        <p:txBody>
-          <a:bodyPr rtlCol="0" anchor="ctr"/>
-          <a:lstStyle/>
-          <a:p>
-            <a:pPr algn="ctr"/>
-            <a:endParaRPr lang="en-US" dirty="0"/>
-          </a:p>
-        </p:txBody>
-      </p:sp>
-      <p:sp>
-        <p:nvSpPr>
-          <p:cNvPr id="22" name="Oval 21">
-            <a:extLst>
-              <a:ext uri="{FF2B5EF4-FFF2-40B4-BE49-F238E27FC236}">
-                <a16:creationId xmlns:a16="http://schemas.microsoft.com/office/drawing/2014/main" id="{B71251BF-249A-5249-9712-310C235682EA}"/>
-              </a:ext>
-            </a:extLst>
-          </p:cNvPr>
-          <p:cNvSpPr/>
+      </p:cxnSp>
+      <p:cxnSp>
+        <p:nvCxnSpPr>
+          <p:cNvPr id="31" name="Straight Connector 30">
+            <a:extLst>
+              <a:ext uri="{FF2B5EF4-FFF2-40B4-BE49-F238E27FC236}">
+                <a16:creationId xmlns:a16="http://schemas.microsoft.com/office/drawing/2014/main" id="{EFC27C68-BB0A-49FA-B6C4-CCBC2EAD2E7C}"/>
+              </a:ext>
+            </a:extLst>
+          </p:cNvPr>
+          <p:cNvCxnSpPr>
+            <a:cxnSpLocks/>
+          </p:cNvCxnSpPr>
           <p:nvPr/>
-        </p:nvSpPr>
-        <p:spPr>
-          <a:xfrm>
-            <a:off x="3592033" y="4223712"/>
-            <a:ext cx="186069" cy="215047"/>
-          </a:xfrm>
-          <a:prstGeom prst="ellipse">
+        </p:nvCxnSpPr>
+        <p:spPr>
+          <a:xfrm flipV="1">
+            <a:off x="9953416" y="3052876"/>
+            <a:ext cx="0" cy="665640"/>
+          </a:xfrm>
+          <a:prstGeom prst="line">
             <a:avLst/>
           </a:prstGeom>
-          <a:solidFill>
-            <a:schemeClr val="tx1"/>
-          </a:solidFill>
+          <a:ln>
+            <a:solidFill>
+              <a:schemeClr val="tx1"/>
+            </a:solidFill>
+            <a:prstDash val="sysDash"/>
+          </a:ln>
         </p:spPr>
         <p:style>
-          <a:lnRef idx="2">
-            <a:schemeClr val="accent1">
-              <a:shade val="50000"/>
-            </a:schemeClr>
+          <a:lnRef idx="1">
+            <a:schemeClr val="accent1"/>
           </a:lnRef>
-          <a:fillRef idx="1">
+          <a:fillRef idx="0">
             <a:schemeClr val="accent1"/>
           </a:fillRef>
           <a:effectRef idx="0">
             <a:schemeClr val="accent1"/>
           </a:effectRef>
           <a:fontRef idx="minor">
-            <a:schemeClr val="lt1"/>
+            <a:schemeClr val="tx1"/>
           </a:fontRef>
         </p:style>
-        <p:txBody>
-          <a:bodyPr rtlCol="0" anchor="ctr"/>
-          <a:lstStyle/>
-          <a:p>
-            <a:pPr algn="ctr"/>
-            <a:endParaRPr lang="en-US" dirty="0"/>
-          </a:p>
-        </p:txBody>
-      </p:sp>
-      <p:sp>
-        <p:nvSpPr>
-          <p:cNvPr id="23" name="Oval 22">
-            <a:extLst>
-              <a:ext uri="{FF2B5EF4-FFF2-40B4-BE49-F238E27FC236}">
-                <a16:creationId xmlns:a16="http://schemas.microsoft.com/office/drawing/2014/main" id="{0BB0CAC2-AADB-E342-8312-195FF3FE35E6}"/>
-              </a:ext>
-            </a:extLst>
-          </p:cNvPr>
-          <p:cNvSpPr/>
+      </p:cxnSp>
+      <p:cxnSp>
+        <p:nvCxnSpPr>
+          <p:cNvPr id="32" name="Straight Connector 31">
+            <a:extLst>
+              <a:ext uri="{FF2B5EF4-FFF2-40B4-BE49-F238E27FC236}">
+                <a16:creationId xmlns:a16="http://schemas.microsoft.com/office/drawing/2014/main" id="{C93E9E22-B33E-4A30-B9DF-5812124BA732}"/>
+              </a:ext>
+            </a:extLst>
+          </p:cNvPr>
+          <p:cNvCxnSpPr>
+            <a:cxnSpLocks/>
+          </p:cNvCxnSpPr>
           <p:nvPr/>
-        </p:nvSpPr>
-        <p:spPr>
-          <a:xfrm>
-            <a:off x="5956891" y="2444901"/>
-            <a:ext cx="186069" cy="215047"/>
-          </a:xfrm>
-          <a:prstGeom prst="ellipse">
+        </p:nvCxnSpPr>
+        <p:spPr>
+          <a:xfrm flipV="1">
+            <a:off x="6628945" y="4011452"/>
+            <a:ext cx="0" cy="665640"/>
+          </a:xfrm>
+          <a:prstGeom prst="line">
             <a:avLst/>
           </a:prstGeom>
-          <a:solidFill>
-            <a:schemeClr val="tx1"/>
-          </a:solidFill>
+          <a:ln>
+            <a:solidFill>
+              <a:schemeClr val="tx1"/>
+            </a:solidFill>
+            <a:prstDash val="sysDash"/>
+          </a:ln>
         </p:spPr>
         <p:style>
-          <a:lnRef idx="2">
-            <a:schemeClr val="accent1">
-              <a:shade val="50000"/>
-            </a:schemeClr>
+          <a:lnRef idx="1">
+            <a:schemeClr val="accent1"/>
           </a:lnRef>
-          <a:fillRef idx="1">
+          <a:fillRef idx="0">
             <a:schemeClr val="accent1"/>
           </a:fillRef>
           <a:effectRef idx="0">
             <a:schemeClr val="accent1"/>
           </a:effectRef>
           <a:fontRef idx="minor">
-            <a:schemeClr val="lt1"/>
+            <a:schemeClr val="tx1"/>
           </a:fontRef>
         </p:style>
-        <p:txBody>
-          <a:bodyPr rtlCol="0" anchor="ctr"/>
-          <a:lstStyle/>
-          <a:p>
-            <a:pPr algn="ctr"/>
-            <a:endParaRPr lang="en-US" dirty="0"/>
-          </a:p>
-        </p:txBody>
-      </p:sp>
-      <p:sp>
-        <p:nvSpPr>
-          <p:cNvPr id="24" name="Oval 23">
-            <a:extLst>
-              <a:ext uri="{FF2B5EF4-FFF2-40B4-BE49-F238E27FC236}">
-                <a16:creationId xmlns:a16="http://schemas.microsoft.com/office/drawing/2014/main" id="{6C37C53F-9BD9-634C-946D-C6B3DA1076A5}"/>
-              </a:ext>
-            </a:extLst>
-          </p:cNvPr>
-          <p:cNvSpPr/>
+      </p:cxnSp>
+      <p:cxnSp>
+        <p:nvCxnSpPr>
+          <p:cNvPr id="33" name="Straight Connector 32">
+            <a:extLst>
+              <a:ext uri="{FF2B5EF4-FFF2-40B4-BE49-F238E27FC236}">
+                <a16:creationId xmlns:a16="http://schemas.microsoft.com/office/drawing/2014/main" id="{71950C82-10D8-483E-ACA7-2D127F85D811}"/>
+              </a:ext>
+            </a:extLst>
+          </p:cNvPr>
+          <p:cNvCxnSpPr>
+            <a:cxnSpLocks/>
+          </p:cNvCxnSpPr>
           <p:nvPr/>
-        </p:nvSpPr>
-        <p:spPr>
-          <a:xfrm>
-            <a:off x="8315547" y="4146981"/>
-            <a:ext cx="186069" cy="215047"/>
-          </a:xfrm>
-          <a:prstGeom prst="ellipse">
+        </p:nvCxnSpPr>
+        <p:spPr>
+          <a:xfrm flipV="1">
+            <a:off x="4326968" y="4049670"/>
+            <a:ext cx="0" cy="486708"/>
+          </a:xfrm>
+          <a:prstGeom prst="line">
             <a:avLst/>
           </a:prstGeom>
-          <a:solidFill>
-            <a:schemeClr val="tx1"/>
-          </a:solidFill>
+          <a:ln>
+            <a:solidFill>
+              <a:schemeClr val="tx1"/>
+            </a:solidFill>
+            <a:prstDash val="sysDash"/>
+          </a:ln>
         </p:spPr>
         <p:style>
-          <a:lnRef idx="2">
-            <a:schemeClr val="accent1">
-              <a:shade val="50000"/>
-            </a:schemeClr>
+          <a:lnRef idx="1">
+            <a:schemeClr val="accent1"/>
           </a:lnRef>
-          <a:fillRef idx="1">
+          <a:fillRef idx="0">
             <a:schemeClr val="accent1"/>
           </a:fillRef>
           <a:effectRef idx="0">
             <a:schemeClr val="accent1"/>
           </a:effectRef>
           <a:fontRef idx="minor">
-            <a:schemeClr val="lt1"/>
+            <a:schemeClr val="tx1"/>
           </a:fontRef>
         </p:style>
-        <p:txBody>
-          <a:bodyPr rtlCol="0" anchor="ctr"/>
-          <a:lstStyle/>
-          <a:p>
-            <a:pPr algn="ctr"/>
-            <a:endParaRPr lang="en-US" dirty="0"/>
-          </a:p>
-        </p:txBody>
-      </p:sp>
-      <p:sp>
-        <p:nvSpPr>
-          <p:cNvPr id="25" name="TextBox 24">
-            <a:extLst>
-              <a:ext uri="{FF2B5EF4-FFF2-40B4-BE49-F238E27FC236}">
-                <a16:creationId xmlns:a16="http://schemas.microsoft.com/office/drawing/2014/main" id="{CF9B86AE-D6C6-194E-8EBD-AF7EB3CC6D10}"/>
+      </p:cxnSp>
+      <p:cxnSp>
+        <p:nvCxnSpPr>
+          <p:cNvPr id="38" name="Straight Connector 37">
+            <a:extLst>
+              <a:ext uri="{FF2B5EF4-FFF2-40B4-BE49-F238E27FC236}">
+                <a16:creationId xmlns:a16="http://schemas.microsoft.com/office/drawing/2014/main" id="{F5A189BE-1799-47BB-AD2C-EAB95B5C143F}"/>
+              </a:ext>
+            </a:extLst>
+          </p:cNvPr>
+          <p:cNvCxnSpPr>
+            <a:cxnSpLocks/>
+          </p:cNvCxnSpPr>
+          <p:nvPr/>
+        </p:nvCxnSpPr>
+        <p:spPr>
+          <a:xfrm flipV="1">
+            <a:off x="8907747" y="4048076"/>
+            <a:ext cx="0" cy="665640"/>
+          </a:xfrm>
+          <a:prstGeom prst="line">
+            <a:avLst/>
+          </a:prstGeom>
+          <a:ln>
+            <a:solidFill>
+              <a:schemeClr val="tx1"/>
+            </a:solidFill>
+            <a:prstDash val="sysDash"/>
+          </a:ln>
+        </p:spPr>
+        <p:style>
+          <a:lnRef idx="1">
+            <a:schemeClr val="accent1"/>
+          </a:lnRef>
+          <a:fillRef idx="0">
+            <a:schemeClr val="accent1"/>
+          </a:fillRef>
+          <a:effectRef idx="0">
+            <a:schemeClr val="accent1"/>
+          </a:effectRef>
+          <a:fontRef idx="minor">
+            <a:schemeClr val="tx1"/>
+          </a:fontRef>
+        </p:style>
+      </p:cxnSp>
+      <p:sp>
+        <p:nvSpPr>
+          <p:cNvPr id="40" name="TextBox 39">
+            <a:extLst>
+              <a:ext uri="{FF2B5EF4-FFF2-40B4-BE49-F238E27FC236}">
+                <a16:creationId xmlns:a16="http://schemas.microsoft.com/office/drawing/2014/main" id="{FFC46D27-99CF-46EB-A2E2-81AA449FB6C8}"/>
               </a:ext>
             </a:extLst>
           </p:cNvPr>
@@ -4051,8 +4620,8 @@
         </p:nvSpPr>
         <p:spPr>
           <a:xfrm>
-            <a:off x="579476" y="1147532"/>
-            <a:ext cx="2775098" cy="1077218"/>
+            <a:off x="558192" y="3974940"/>
+            <a:ext cx="652743" cy="369332"/>
           </a:xfrm>
           <a:prstGeom prst="rect">
             <a:avLst/>
@@ -4060,38 +4629,24 @@
           <a:noFill/>
         </p:spPr>
         <p:txBody>
-          <a:bodyPr wrap="square" rtlCol="0">
+          <a:bodyPr wrap="none" rtlCol="0">
             <a:spAutoFit/>
           </a:bodyPr>
           <a:lstStyle/>
           <a:p>
             <a:r>
-              <a:rPr lang="en-US" sz="1600" dirty="0"/>
-              <a:t>Second driverless competition was held at </a:t>
-            </a:r>
-            <a:r>
-              <a:rPr lang="en-US" sz="1600" dirty="0" err="1"/>
-              <a:t>Mojava</a:t>
-            </a:r>
-            <a:r>
-              <a:rPr lang="en-US" sz="1600" dirty="0"/>
-              <a:t> Desert, CA.</a:t>
-            </a:r>
-          </a:p>
-          <a:p>
-            <a:r>
-              <a:rPr lang="en-US" sz="1600" dirty="0"/>
-              <a:t>Ford was one of the team to qualify for the challenge.</a:t>
-            </a:r>
-          </a:p>
-        </p:txBody>
-      </p:sp>
-      <p:sp>
-        <p:nvSpPr>
-          <p:cNvPr id="26" name="TextBox 25">
-            <a:extLst>
-              <a:ext uri="{FF2B5EF4-FFF2-40B4-BE49-F238E27FC236}">
-                <a16:creationId xmlns:a16="http://schemas.microsoft.com/office/drawing/2014/main" id="{F17843B3-FD2A-7E42-B858-3B09FFB07CB3}"/>
+              <a:rPr lang="en-US" dirty="0"/>
+              <a:t>1980</a:t>
+            </a:r>
+          </a:p>
+        </p:txBody>
+      </p:sp>
+      <p:sp>
+        <p:nvSpPr>
+          <p:cNvPr id="41" name="TextBox 40">
+            <a:extLst>
+              <a:ext uri="{FF2B5EF4-FFF2-40B4-BE49-F238E27FC236}">
+                <a16:creationId xmlns:a16="http://schemas.microsoft.com/office/drawing/2014/main" id="{420728DC-8B00-4B14-BFD9-8C9B711307E3}"/>
               </a:ext>
             </a:extLst>
           </p:cNvPr>
@@ -4100,8 +4655,8 @@
         </p:nvSpPr>
         <p:spPr>
           <a:xfrm>
-            <a:off x="3181793" y="4583221"/>
-            <a:ext cx="2775098" cy="1323439"/>
+            <a:off x="1769820" y="3587420"/>
+            <a:ext cx="652743" cy="369332"/>
           </a:xfrm>
           <a:prstGeom prst="rect">
             <a:avLst/>
@@ -4109,24 +4664,24 @@
           <a:noFill/>
         </p:spPr>
         <p:txBody>
-          <a:bodyPr wrap="square" rtlCol="0">
+          <a:bodyPr wrap="none" rtlCol="0">
             <a:spAutoFit/>
           </a:bodyPr>
           <a:lstStyle/>
           <a:p>
             <a:r>
-              <a:rPr lang="en-US" sz="1600" dirty="0"/>
-              <a:t>Ford sent a car to 25 state journey with collision and brake assistance support systems for one of their autonomous project</a:t>
-            </a:r>
-          </a:p>
-        </p:txBody>
-      </p:sp>
-      <p:sp>
-        <p:nvSpPr>
-          <p:cNvPr id="27" name="TextBox 26">
-            <a:extLst>
-              <a:ext uri="{FF2B5EF4-FFF2-40B4-BE49-F238E27FC236}">
-                <a16:creationId xmlns:a16="http://schemas.microsoft.com/office/drawing/2014/main" id="{90007948-B063-634A-A748-7DABA82DC4BF}"/>
+              <a:rPr lang="en-US" dirty="0"/>
+              <a:t>1990</a:t>
+            </a:r>
+          </a:p>
+        </p:txBody>
+      </p:sp>
+      <p:sp>
+        <p:nvSpPr>
+          <p:cNvPr id="42" name="TextBox 41">
+            <a:extLst>
+              <a:ext uri="{FF2B5EF4-FFF2-40B4-BE49-F238E27FC236}">
+                <a16:creationId xmlns:a16="http://schemas.microsoft.com/office/drawing/2014/main" id="{79500364-02F2-4591-89A6-4FA93E12BC18}"/>
               </a:ext>
             </a:extLst>
           </p:cNvPr>
@@ -4135,8 +4690,8 @@
         </p:nvSpPr>
         <p:spPr>
           <a:xfrm>
-            <a:off x="5661838" y="1100110"/>
-            <a:ext cx="2775098" cy="830997"/>
+            <a:off x="444696" y="4882825"/>
+            <a:ext cx="3053100" cy="1384995"/>
           </a:xfrm>
           <a:prstGeom prst="rect">
             <a:avLst/>
@@ -4150,18 +4705,40 @@
           <a:lstStyle/>
           <a:p>
             <a:r>
-              <a:rPr lang="en-US" sz="1600" dirty="0"/>
-              <a:t>Ford got license to test autonomous vehicles at Palo Alto, CA</a:t>
-            </a:r>
-          </a:p>
-        </p:txBody>
-      </p:sp>
-      <p:sp>
-        <p:nvSpPr>
-          <p:cNvPr id="28" name="TextBox 27">
-            <a:extLst>
-              <a:ext uri="{FF2B5EF4-FFF2-40B4-BE49-F238E27FC236}">
-                <a16:creationId xmlns:a16="http://schemas.microsoft.com/office/drawing/2014/main" id="{C79F7D88-A370-0644-9467-A7AABE4A5F3F}"/>
+              <a:rPr lang="en-US" sz="1050" b="1" dirty="0"/>
+              <a:t>The </a:t>
+            </a:r>
+            <a:r>
+              <a:rPr lang="en-US" sz="1050" b="1" dirty="0" err="1"/>
+              <a:t>ParkShuttle</a:t>
+            </a:r>
+            <a:r>
+              <a:rPr lang="en-US" sz="1050" b="1" dirty="0"/>
+              <a:t> is an automated people mover that employs artificial reference points (magnets) implanted in the road surface to verify its location. It is described as the world's first autonomous vehicle.</a:t>
+            </a:r>
+          </a:p>
+          <a:p>
+            <a:r>
+              <a:rPr lang="en-US" sz="1050" b="1" dirty="0"/>
+              <a:t> In the Netherlands, two pilot projects were launched: Schiphol Airport (December 1997) and </a:t>
+            </a:r>
+            <a:r>
+              <a:rPr lang="en-US" sz="1050" b="1" dirty="0" err="1"/>
+              <a:t>Rivium</a:t>
+            </a:r>
+            <a:r>
+              <a:rPr lang="en-US" sz="1050" b="1" dirty="0"/>
+              <a:t> Business Park (1999).</a:t>
+            </a:r>
+          </a:p>
+        </p:txBody>
+      </p:sp>
+      <p:sp>
+        <p:nvSpPr>
+          <p:cNvPr id="43" name="TextBox 42">
+            <a:extLst>
+              <a:ext uri="{FF2B5EF4-FFF2-40B4-BE49-F238E27FC236}">
+                <a16:creationId xmlns:a16="http://schemas.microsoft.com/office/drawing/2014/main" id="{6CCE6755-D56B-4F5B-9532-FE223EDC410F}"/>
               </a:ext>
             </a:extLst>
           </p:cNvPr>
@@ -4170,8 +4747,8 @@
         </p:nvSpPr>
         <p:spPr>
           <a:xfrm>
-            <a:off x="8203019" y="4584744"/>
-            <a:ext cx="2775098" cy="1077218"/>
+            <a:off x="8295065" y="4851282"/>
+            <a:ext cx="1550271" cy="1569660"/>
           </a:xfrm>
           <a:prstGeom prst="rect">
             <a:avLst/>
@@ -4185,8 +4762,512 @@
           <a:lstStyle/>
           <a:p>
             <a:r>
-              <a:rPr lang="en-US" sz="1600" dirty="0"/>
+              <a:rPr lang="en-US" sz="1200" b="1" dirty="0"/>
+              <a:t>Demo I (US Army), Demo II (DARPA), and Demo III (US Navy) were three military projects financed by the US government (US Army). </a:t>
+            </a:r>
+          </a:p>
+        </p:txBody>
+      </p:sp>
+      <p:sp>
+        <p:nvSpPr>
+          <p:cNvPr id="44" name="TextBox 43">
+            <a:extLst>
+              <a:ext uri="{FF2B5EF4-FFF2-40B4-BE49-F238E27FC236}">
+                <a16:creationId xmlns:a16="http://schemas.microsoft.com/office/drawing/2014/main" id="{5D23E703-E4A6-4A0C-8BC7-9F76482EE677}"/>
+              </a:ext>
+            </a:extLst>
+          </p:cNvPr>
+          <p:cNvSpPr txBox="1"/>
+          <p:nvPr/>
+        </p:nvSpPr>
+        <p:spPr>
+          <a:xfrm>
+            <a:off x="2761248" y="3978031"/>
+            <a:ext cx="652743" cy="369332"/>
+          </a:xfrm>
+          <a:prstGeom prst="rect">
+            <a:avLst/>
+          </a:prstGeom>
+          <a:noFill/>
+        </p:spPr>
+        <p:txBody>
+          <a:bodyPr wrap="none" rtlCol="0">
+            <a:spAutoFit/>
+          </a:bodyPr>
+          <a:lstStyle/>
+          <a:p>
+            <a:r>
+              <a:rPr lang="en-US" dirty="0"/>
+              <a:t>2000</a:t>
+            </a:r>
+          </a:p>
+        </p:txBody>
+      </p:sp>
+      <p:sp>
+        <p:nvSpPr>
+          <p:cNvPr id="46" name="TextBox 45">
+            <a:extLst>
+              <a:ext uri="{FF2B5EF4-FFF2-40B4-BE49-F238E27FC236}">
+                <a16:creationId xmlns:a16="http://schemas.microsoft.com/office/drawing/2014/main" id="{8F4CC3A5-BF7C-4E4E-9BFE-5EA1C9E7378E}"/>
+              </a:ext>
+            </a:extLst>
+          </p:cNvPr>
+          <p:cNvSpPr txBox="1"/>
+          <p:nvPr/>
+        </p:nvSpPr>
+        <p:spPr>
+          <a:xfrm>
+            <a:off x="3987879" y="3547973"/>
+            <a:ext cx="6094520" cy="369332"/>
+          </a:xfrm>
+          <a:prstGeom prst="rect">
+            <a:avLst/>
+          </a:prstGeom>
+          <a:noFill/>
+        </p:spPr>
+        <p:txBody>
+          <a:bodyPr wrap="square">
+            <a:spAutoFit/>
+          </a:bodyPr>
+          <a:lstStyle/>
+          <a:p>
+            <a:r>
+              <a:rPr lang="en-US" dirty="0"/>
+              <a:t>2005</a:t>
+            </a:r>
+          </a:p>
+        </p:txBody>
+      </p:sp>
+      <p:sp>
+        <p:nvSpPr>
+          <p:cNvPr id="48" name="TextBox 47">
+            <a:extLst>
+              <a:ext uri="{FF2B5EF4-FFF2-40B4-BE49-F238E27FC236}">
+                <a16:creationId xmlns:a16="http://schemas.microsoft.com/office/drawing/2014/main" id="{2583807E-70EC-41B7-B44D-1BB0E4E37D93}"/>
+              </a:ext>
+            </a:extLst>
+          </p:cNvPr>
+          <p:cNvSpPr txBox="1"/>
+          <p:nvPr/>
+        </p:nvSpPr>
+        <p:spPr>
+          <a:xfrm>
+            <a:off x="3497796" y="4885916"/>
+            <a:ext cx="2255498" cy="830997"/>
+          </a:xfrm>
+          <a:prstGeom prst="rect">
+            <a:avLst/>
+          </a:prstGeom>
+          <a:noFill/>
+        </p:spPr>
+        <p:txBody>
+          <a:bodyPr wrap="square">
+            <a:spAutoFit/>
+          </a:bodyPr>
+          <a:lstStyle/>
+          <a:p>
+            <a:r>
+              <a:rPr lang="en-US" sz="1200" b="1" dirty="0"/>
+              <a:t>Second driverless competition was held at </a:t>
+            </a:r>
+            <a:r>
+              <a:rPr lang="en-US" sz="1200" b="1" dirty="0" err="1"/>
+              <a:t>Mojava</a:t>
+            </a:r>
+            <a:r>
+              <a:rPr lang="en-US" sz="1200" b="1" dirty="0"/>
+              <a:t> Desert, CA.</a:t>
+            </a:r>
+          </a:p>
+          <a:p>
+            <a:r>
+              <a:rPr lang="en-US" sz="1200" b="1" dirty="0"/>
+              <a:t>Ford was one of the team to qualify for the challenge.</a:t>
+            </a:r>
+          </a:p>
+        </p:txBody>
+      </p:sp>
+      <p:sp>
+        <p:nvSpPr>
+          <p:cNvPr id="50" name="TextBox 49">
+            <a:extLst>
+              <a:ext uri="{FF2B5EF4-FFF2-40B4-BE49-F238E27FC236}">
+                <a16:creationId xmlns:a16="http://schemas.microsoft.com/office/drawing/2014/main" id="{7138704F-E7D2-4431-9F8F-E0DBA1ED9957}"/>
+              </a:ext>
+            </a:extLst>
+          </p:cNvPr>
+          <p:cNvSpPr txBox="1"/>
+          <p:nvPr/>
+        </p:nvSpPr>
+        <p:spPr>
+          <a:xfrm>
+            <a:off x="5051897" y="4001638"/>
+            <a:ext cx="6094520" cy="369332"/>
+          </a:xfrm>
+          <a:prstGeom prst="rect">
+            <a:avLst/>
+          </a:prstGeom>
+          <a:noFill/>
+        </p:spPr>
+        <p:txBody>
+          <a:bodyPr wrap="square">
+            <a:spAutoFit/>
+          </a:bodyPr>
+          <a:lstStyle/>
+          <a:p>
+            <a:r>
+              <a:rPr lang="en-US" dirty="0"/>
+              <a:t>2009</a:t>
+            </a:r>
+          </a:p>
+        </p:txBody>
+      </p:sp>
+      <p:sp>
+        <p:nvSpPr>
+          <p:cNvPr id="52" name="TextBox 51">
+            <a:extLst>
+              <a:ext uri="{FF2B5EF4-FFF2-40B4-BE49-F238E27FC236}">
+                <a16:creationId xmlns:a16="http://schemas.microsoft.com/office/drawing/2014/main" id="{B1D39BC0-1FE2-4329-BB2E-0B5F1C0BB74A}"/>
+              </a:ext>
+            </a:extLst>
+          </p:cNvPr>
+          <p:cNvSpPr txBox="1"/>
+          <p:nvPr/>
+        </p:nvSpPr>
+        <p:spPr>
+          <a:xfrm>
+            <a:off x="4425990" y="1666471"/>
+            <a:ext cx="2271241" cy="1169551"/>
+          </a:xfrm>
+          <a:prstGeom prst="rect">
+            <a:avLst/>
+          </a:prstGeom>
+          <a:noFill/>
+        </p:spPr>
+        <p:txBody>
+          <a:bodyPr wrap="square">
+            <a:spAutoFit/>
+          </a:bodyPr>
+          <a:lstStyle/>
+          <a:p>
+            <a:r>
+              <a:rPr lang="en-US" sz="1400" b="1" dirty="0"/>
+              <a:t>Ford sent a car to 25 state journey with collision and brake assistance support systems for one of their autonomous project</a:t>
+            </a:r>
+          </a:p>
+        </p:txBody>
+      </p:sp>
+      <p:sp>
+        <p:nvSpPr>
+          <p:cNvPr id="54" name="TextBox 53">
+            <a:extLst>
+              <a:ext uri="{FF2B5EF4-FFF2-40B4-BE49-F238E27FC236}">
+                <a16:creationId xmlns:a16="http://schemas.microsoft.com/office/drawing/2014/main" id="{81346EE0-26B1-4E0D-8311-69F83BDF67E2}"/>
+              </a:ext>
+            </a:extLst>
+          </p:cNvPr>
+          <p:cNvSpPr txBox="1"/>
+          <p:nvPr/>
+        </p:nvSpPr>
+        <p:spPr>
+          <a:xfrm>
+            <a:off x="6345863" y="3592378"/>
+            <a:ext cx="676860" cy="369332"/>
+          </a:xfrm>
+          <a:prstGeom prst="rect">
+            <a:avLst/>
+          </a:prstGeom>
+          <a:noFill/>
+        </p:spPr>
+        <p:txBody>
+          <a:bodyPr wrap="square">
+            <a:spAutoFit/>
+          </a:bodyPr>
+          <a:lstStyle/>
+          <a:p>
+            <a:r>
+              <a:rPr lang="en-US" dirty="0"/>
+              <a:t>2010</a:t>
+            </a:r>
+          </a:p>
+        </p:txBody>
+      </p:sp>
+      <p:sp>
+        <p:nvSpPr>
+          <p:cNvPr id="56" name="TextBox 55">
+            <a:extLst>
+              <a:ext uri="{FF2B5EF4-FFF2-40B4-BE49-F238E27FC236}">
+                <a16:creationId xmlns:a16="http://schemas.microsoft.com/office/drawing/2014/main" id="{6A5A838F-EE8F-45A3-B58C-5AD9F97D100D}"/>
+              </a:ext>
+            </a:extLst>
+          </p:cNvPr>
+          <p:cNvSpPr txBox="1"/>
+          <p:nvPr/>
+        </p:nvSpPr>
+        <p:spPr>
+          <a:xfrm>
+            <a:off x="2341074" y="1911219"/>
+            <a:ext cx="1813507" cy="960332"/>
+          </a:xfrm>
+          <a:prstGeom prst="rect">
+            <a:avLst/>
+          </a:prstGeom>
+          <a:noFill/>
+        </p:spPr>
+        <p:txBody>
+          <a:bodyPr wrap="square">
+            <a:spAutoFit/>
+          </a:bodyPr>
+          <a:lstStyle/>
+          <a:p>
+            <a:r>
+              <a:rPr lang="en-US" sz="1400" b="1" dirty="0"/>
+              <a:t>Ford got license to test autonomous vehicles at Palo Alto, CA</a:t>
+            </a:r>
+          </a:p>
+        </p:txBody>
+      </p:sp>
+      <p:sp>
+        <p:nvSpPr>
+          <p:cNvPr id="58" name="TextBox 57">
+            <a:extLst>
+              <a:ext uri="{FF2B5EF4-FFF2-40B4-BE49-F238E27FC236}">
+                <a16:creationId xmlns:a16="http://schemas.microsoft.com/office/drawing/2014/main" id="{7CE04AB2-12F4-4CD3-846B-61653651ACA1}"/>
+              </a:ext>
+            </a:extLst>
+          </p:cNvPr>
+          <p:cNvSpPr txBox="1"/>
+          <p:nvPr/>
+        </p:nvSpPr>
+        <p:spPr>
+          <a:xfrm>
+            <a:off x="5738201" y="4861430"/>
+            <a:ext cx="2538289" cy="1015663"/>
+          </a:xfrm>
+          <a:prstGeom prst="rect">
+            <a:avLst/>
+          </a:prstGeom>
+          <a:noFill/>
+        </p:spPr>
+        <p:txBody>
+          <a:bodyPr wrap="square">
+            <a:spAutoFit/>
+          </a:bodyPr>
+          <a:lstStyle/>
+          <a:p>
+            <a:r>
+              <a:rPr lang="en-US" sz="1200" b="1" dirty="0"/>
+              <a:t>Many major automakers, including General Motors, Ford, Mercedes-Benz, Volkswagen, Audi, Nissan, Toyota, BMW, and Volvo, are now testing self-driving cars.</a:t>
+            </a:r>
+          </a:p>
+        </p:txBody>
+      </p:sp>
+      <p:sp>
+        <p:nvSpPr>
+          <p:cNvPr id="59" name="TextBox 58">
+            <a:extLst>
+              <a:ext uri="{FF2B5EF4-FFF2-40B4-BE49-F238E27FC236}">
+                <a16:creationId xmlns:a16="http://schemas.microsoft.com/office/drawing/2014/main" id="{99E6D0D1-624D-4AD6-AE35-1C0485FF9FD7}"/>
+              </a:ext>
+            </a:extLst>
+          </p:cNvPr>
+          <p:cNvSpPr txBox="1"/>
+          <p:nvPr/>
+        </p:nvSpPr>
+        <p:spPr>
+          <a:xfrm>
+            <a:off x="7318861" y="3923692"/>
+            <a:ext cx="652743" cy="369332"/>
+          </a:xfrm>
+          <a:prstGeom prst="rect">
+            <a:avLst/>
+          </a:prstGeom>
+          <a:noFill/>
+        </p:spPr>
+        <p:txBody>
+          <a:bodyPr wrap="none" rtlCol="0">
+            <a:spAutoFit/>
+          </a:bodyPr>
+          <a:lstStyle/>
+          <a:p>
+            <a:r>
+              <a:rPr lang="en-US" dirty="0"/>
+              <a:t>2016</a:t>
+            </a:r>
+          </a:p>
+        </p:txBody>
+      </p:sp>
+      <p:sp>
+        <p:nvSpPr>
+          <p:cNvPr id="61" name="TextBox 60">
+            <a:extLst>
+              <a:ext uri="{FF2B5EF4-FFF2-40B4-BE49-F238E27FC236}">
+                <a16:creationId xmlns:a16="http://schemas.microsoft.com/office/drawing/2014/main" id="{3D48FF8C-1BAA-4961-976C-9EAE64DB27DE}"/>
+              </a:ext>
+            </a:extLst>
+          </p:cNvPr>
+          <p:cNvSpPr txBox="1"/>
+          <p:nvPr/>
+        </p:nvSpPr>
+        <p:spPr>
+          <a:xfrm>
+            <a:off x="7095896" y="1692331"/>
+            <a:ext cx="1716834" cy="1200329"/>
+          </a:xfrm>
+          <a:prstGeom prst="rect">
+            <a:avLst/>
+          </a:prstGeom>
+          <a:noFill/>
+        </p:spPr>
+        <p:txBody>
+          <a:bodyPr wrap="square">
+            <a:spAutoFit/>
+          </a:bodyPr>
+          <a:lstStyle/>
+          <a:p>
+            <a:r>
+              <a:rPr lang="en-US" sz="1200" b="1" dirty="0"/>
+              <a:t>Tesla sent a select number of testers in the United States a "beta" version of its "Full Self-Driving" software in October 2020.</a:t>
+            </a:r>
+          </a:p>
+        </p:txBody>
+      </p:sp>
+      <p:sp>
+        <p:nvSpPr>
+          <p:cNvPr id="62" name="TextBox 61">
+            <a:extLst>
+              <a:ext uri="{FF2B5EF4-FFF2-40B4-BE49-F238E27FC236}">
+                <a16:creationId xmlns:a16="http://schemas.microsoft.com/office/drawing/2014/main" id="{D7B19004-E33A-4223-8557-2D5C7CB7D08A}"/>
+              </a:ext>
+            </a:extLst>
+          </p:cNvPr>
+          <p:cNvSpPr txBox="1"/>
+          <p:nvPr/>
+        </p:nvSpPr>
+        <p:spPr>
+          <a:xfrm>
+            <a:off x="8484586" y="3531159"/>
+            <a:ext cx="652743" cy="369332"/>
+          </a:xfrm>
+          <a:prstGeom prst="rect">
+            <a:avLst/>
+          </a:prstGeom>
+          <a:noFill/>
+        </p:spPr>
+        <p:txBody>
+          <a:bodyPr wrap="none" rtlCol="0">
+            <a:spAutoFit/>
+          </a:bodyPr>
+          <a:lstStyle/>
+          <a:p>
+            <a:r>
+              <a:rPr lang="en-US" dirty="0"/>
+              <a:t>2020</a:t>
+            </a:r>
+          </a:p>
+        </p:txBody>
+      </p:sp>
+      <p:sp>
+        <p:nvSpPr>
+          <p:cNvPr id="64" name="TextBox 63">
+            <a:extLst>
+              <a:ext uri="{FF2B5EF4-FFF2-40B4-BE49-F238E27FC236}">
+                <a16:creationId xmlns:a16="http://schemas.microsoft.com/office/drawing/2014/main" id="{48BBF9D7-BD31-4195-8520-F5AB1BD5F58D}"/>
+              </a:ext>
+            </a:extLst>
+          </p:cNvPr>
+          <p:cNvSpPr txBox="1"/>
+          <p:nvPr/>
+        </p:nvSpPr>
+        <p:spPr>
+          <a:xfrm>
+            <a:off x="9685018" y="3921284"/>
+            <a:ext cx="652743" cy="369332"/>
+          </a:xfrm>
+          <a:prstGeom prst="rect">
+            <a:avLst/>
+          </a:prstGeom>
+          <a:noFill/>
+        </p:spPr>
+        <p:txBody>
+          <a:bodyPr wrap="square">
+            <a:spAutoFit/>
+          </a:bodyPr>
+          <a:lstStyle/>
+          <a:p>
+            <a:r>
+              <a:rPr lang="en-US" dirty="0"/>
+              <a:t>2021</a:t>
+            </a:r>
+          </a:p>
+        </p:txBody>
+      </p:sp>
+      <p:sp>
+        <p:nvSpPr>
+          <p:cNvPr id="66" name="TextBox 65">
+            <a:extLst>
+              <a:ext uri="{FF2B5EF4-FFF2-40B4-BE49-F238E27FC236}">
+                <a16:creationId xmlns:a16="http://schemas.microsoft.com/office/drawing/2014/main" id="{0518E023-FC68-40DD-B305-0E54DA2A8854}"/>
+              </a:ext>
+            </a:extLst>
+          </p:cNvPr>
+          <p:cNvSpPr txBox="1"/>
+          <p:nvPr/>
+        </p:nvSpPr>
+        <p:spPr>
+          <a:xfrm>
+            <a:off x="9184207" y="1741216"/>
+            <a:ext cx="1879925" cy="1015663"/>
+          </a:xfrm>
+          <a:prstGeom prst="rect">
+            <a:avLst/>
+          </a:prstGeom>
+          <a:noFill/>
+        </p:spPr>
+        <p:txBody>
+          <a:bodyPr wrap="square">
+            <a:spAutoFit/>
+          </a:bodyPr>
+          <a:lstStyle/>
+          <a:p>
+            <a:r>
+              <a:rPr lang="en-US" sz="1200" b="1" dirty="0"/>
               <a:t>Ford is planning to produce Level 4 autonomous vehicles for ride hailing and sharing services.</a:t>
+            </a:r>
+          </a:p>
+        </p:txBody>
+      </p:sp>
+      <p:sp>
+        <p:nvSpPr>
+          <p:cNvPr id="67" name="TextBox 66">
+            <a:extLst>
+              <a:ext uri="{FF2B5EF4-FFF2-40B4-BE49-F238E27FC236}">
+                <a16:creationId xmlns:a16="http://schemas.microsoft.com/office/drawing/2014/main" id="{D337C369-2362-49C0-9D72-519846FC8C6B}"/>
+              </a:ext>
+            </a:extLst>
+          </p:cNvPr>
+          <p:cNvSpPr txBox="1"/>
+          <p:nvPr/>
+        </p:nvSpPr>
+        <p:spPr>
+          <a:xfrm>
+            <a:off x="3639517" y="405865"/>
+            <a:ext cx="4197367" cy="369332"/>
+          </a:xfrm>
+          <a:prstGeom prst="rect">
+            <a:avLst/>
+          </a:prstGeom>
+          <a:noFill/>
+        </p:spPr>
+        <p:txBody>
+          <a:bodyPr wrap="none" rtlCol="0">
+            <a:spAutoFit/>
+          </a:bodyPr>
+          <a:lstStyle/>
+          <a:p>
+            <a:r>
+              <a:rPr lang="en-US" b="1" u="sng" dirty="0"/>
+              <a:t>Timeline of events in Autonomous Driving</a:t>
             </a:r>
           </a:p>
         </p:txBody>
@@ -4194,7 +5275,7 @@
     </p:spTree>
     <p:extLst>
       <p:ext uri="{BB962C8B-B14F-4D97-AF65-F5344CB8AC3E}">
-        <p14:creationId xmlns:p14="http://schemas.microsoft.com/office/powerpoint/2010/main" val="3234429618"/>
+        <p14:creationId xmlns:p14="http://schemas.microsoft.com/office/powerpoint/2010/main" val="135584683"/>
       </p:ext>
     </p:extLst>
   </p:cSld>

</xml_diff>